<commit_message>
changed wording in summary
</commit_message>
<xml_diff>
--- a/doc/Graph-Embedding Presentation.pptx
+++ b/doc/Graph-Embedding Presentation.pptx
@@ -6671,24 +6671,20 @@
             </a:r>
             <a:r>
               <a:rPr lang="en-US" dirty="0"/>
-              <a:t>.</a:t>
-            </a:r>
-          </a:p>
-          <a:p>
-            <a:pPr lvl="1"/>
-            <a:r>
-              <a:rPr lang="en-US" b="0" i="0" dirty="0">
+              <a:t>.                </a:t>
+            </a:r>
+            <a:r>
+              <a:rPr lang="en-US" sz="2000" dirty="0"/>
+              <a:t>(</a:t>
+            </a:r>
+            <a:r>
+              <a:rPr lang="en-US" sz="2000" b="0" i="0" dirty="0">
                 <a:effectLst/>
                 <a:latin typeface="gg sans"/>
               </a:rPr>
-              <a:t>Specifically, in F1 and AUC scores</a:t>
-            </a:r>
-          </a:p>
-          <a:p>
-            <a:pPr marL="457200" lvl="1" indent="0">
-              <a:buNone/>
-            </a:pPr>
-            <a:endParaRPr lang="en-US" dirty="0"/>
+              <a:t>Specifically, in F1 and AUC scores)</a:t>
+            </a:r>
+            <a:endParaRPr lang="en-US" sz="2000" dirty="0"/>
           </a:p>
           <a:p>
             <a:r>
@@ -6700,7 +6696,22 @@
             <a:pPr lvl="1"/>
             <a:r>
               <a:rPr lang="en-US" dirty="0"/>
-              <a:t>Accuracy average is low compared to other graph-embedding algorithms such as GAT and GCN, might be because of poor implementation of the algorithms in the given project</a:t>
+              <a:t>Scores low compared to other algorithms GAT or GCN. </a:t>
+            </a:r>
+          </a:p>
+          <a:p>
+            <a:pPr lvl="1"/>
+            <a:r>
+              <a:rPr lang="en-US" dirty="0"/>
+              <a:t>This might be because of implementation of the algorithms and the </a:t>
+            </a:r>
+            <a:r>
+              <a:rPr lang="en-US"/>
+              <a:t>used datasets </a:t>
+            </a:r>
+            <a:r>
+              <a:rPr lang="en-US" dirty="0"/>
+              <a:t>in the given project</a:t>
             </a:r>
           </a:p>
         </p:txBody>

</xml_diff>

<commit_message>
updated refrences, and number of random walks
</commit_message>
<xml_diff>
--- a/doc/Graph-Embedding Presentation.pptx
+++ b/doc/Graph-Embedding Presentation.pptx
@@ -217,7 +217,7 @@
           <a:p>
             <a:fld id="{40255490-F3EC-4464-B815-288EE6CB06A0}" type="datetimeFigureOut">
               <a:rPr lang="en-US" smtClean="0"/>
-              <a:t>1/27/2025</a:t>
+              <a:t>1/28/2025</a:t>
             </a:fld>
             <a:endParaRPr lang="en-US"/>
           </a:p>
@@ -820,6 +820,24 @@
               <a:t>Sg=1, target word to other words</a:t>
             </a:r>
           </a:p>
+          <a:p>
+            <a:r>
+              <a:rPr lang="en-US" dirty="0"/>
+              <a:t>	it guesses the context of the surrounding words</a:t>
+            </a:r>
+          </a:p>
+          <a:p>
+            <a:endParaRPr lang="en-US" dirty="0"/>
+          </a:p>
+          <a:p>
+            <a:r>
+              <a:rPr lang="en-US" dirty="0"/>
+              <a:t>SG=0, it guesses the context of the word based on its surrounding</a:t>
+            </a:r>
+          </a:p>
+          <a:p>
+            <a:endParaRPr lang="en-US" dirty="0"/>
+          </a:p>
         </p:txBody>
       </p:sp>
       <p:sp>
@@ -1375,6 +1393,90 @@
     <p:extLst>
       <p:ext uri="{BB962C8B-B14F-4D97-AF65-F5344CB8AC3E}">
         <p14:creationId xmlns:p14="http://schemas.microsoft.com/office/powerpoint/2010/main" val="2672321099"/>
+      </p:ext>
+    </p:extLst>
+  </p:cSld>
+  <p:clrMapOvr>
+    <a:masterClrMapping/>
+  </p:clrMapOvr>
+</p:notes>
+</file>
+
+<file path=ppt/notesSlides/notesSlide7.xml><?xml version="1.0" encoding="utf-8"?>
+<p:notes xmlns:a="http://schemas.openxmlformats.org/drawingml/2006/main" xmlns:r="http://schemas.openxmlformats.org/officeDocument/2006/relationships" xmlns:p="http://schemas.openxmlformats.org/presentationml/2006/main">
+  <p:cSld>
+    <p:spTree>
+      <p:nvGrpSpPr>
+        <p:cNvPr id="1" name=""/>
+        <p:cNvGrpSpPr/>
+        <p:nvPr/>
+      </p:nvGrpSpPr>
+      <p:grpSpPr>
+        <a:xfrm>
+          <a:off x="0" y="0"/>
+          <a:ext cx="0" cy="0"/>
+          <a:chOff x="0" y="0"/>
+          <a:chExt cx="0" cy="0"/>
+        </a:xfrm>
+      </p:grpSpPr>
+      <p:sp>
+        <p:nvSpPr>
+          <p:cNvPr id="2" name="Slide Image Placeholder 1"/>
+          <p:cNvSpPr>
+            <a:spLocks noGrp="1" noRot="1" noChangeAspect="1"/>
+          </p:cNvSpPr>
+          <p:nvPr>
+            <p:ph type="sldImg"/>
+          </p:nvPr>
+        </p:nvSpPr>
+        <p:spPr/>
+      </p:sp>
+      <p:sp>
+        <p:nvSpPr>
+          <p:cNvPr id="3" name="Notes Placeholder 2"/>
+          <p:cNvSpPr>
+            <a:spLocks noGrp="1"/>
+          </p:cNvSpPr>
+          <p:nvPr>
+            <p:ph type="body" idx="1"/>
+          </p:nvPr>
+        </p:nvSpPr>
+        <p:spPr/>
+        <p:txBody>
+          <a:bodyPr/>
+          <a:lstStyle/>
+          <a:p>
+            <a:endParaRPr lang="en-IL" dirty="0"/>
+          </a:p>
+        </p:txBody>
+      </p:sp>
+      <p:sp>
+        <p:nvSpPr>
+          <p:cNvPr id="4" name="Slide Number Placeholder 3"/>
+          <p:cNvSpPr>
+            <a:spLocks noGrp="1"/>
+          </p:cNvSpPr>
+          <p:nvPr>
+            <p:ph type="sldNum" sz="quarter" idx="5"/>
+          </p:nvPr>
+        </p:nvSpPr>
+        <p:spPr/>
+        <p:txBody>
+          <a:bodyPr/>
+          <a:lstStyle/>
+          <a:p>
+            <a:fld id="{AFC9B226-C9A0-4F2E-8FB6-1ABBD39453D5}" type="slidenum">
+              <a:rPr lang="en-US" smtClean="0"/>
+              <a:t>21</a:t>
+            </a:fld>
+            <a:endParaRPr lang="en-US"/>
+          </a:p>
+        </p:txBody>
+      </p:sp>
+    </p:spTree>
+    <p:extLst>
+      <p:ext uri="{BB962C8B-B14F-4D97-AF65-F5344CB8AC3E}">
+        <p14:creationId xmlns:p14="http://schemas.microsoft.com/office/powerpoint/2010/main" val="3322153257"/>
       </p:ext>
     </p:extLst>
   </p:cSld>
@@ -1531,7 +1633,7 @@
           <a:p>
             <a:fld id="{6FC2E1BB-ABA2-49E9-A8D9-545C2DE0A0F4}" type="datetimeFigureOut">
               <a:rPr lang="en-US" smtClean="0"/>
-              <a:t>1/27/2025</a:t>
+              <a:t>1/28/2025</a:t>
             </a:fld>
             <a:endParaRPr lang="en-US"/>
           </a:p>
@@ -1729,7 +1831,7 @@
           <a:p>
             <a:fld id="{6FC2E1BB-ABA2-49E9-A8D9-545C2DE0A0F4}" type="datetimeFigureOut">
               <a:rPr lang="en-US" smtClean="0"/>
-              <a:t>1/27/2025</a:t>
+              <a:t>1/28/2025</a:t>
             </a:fld>
             <a:endParaRPr lang="en-US"/>
           </a:p>
@@ -1937,7 +2039,7 @@
           <a:p>
             <a:fld id="{6FC2E1BB-ABA2-49E9-A8D9-545C2DE0A0F4}" type="datetimeFigureOut">
               <a:rPr lang="en-US" smtClean="0"/>
-              <a:t>1/27/2025</a:t>
+              <a:t>1/28/2025</a:t>
             </a:fld>
             <a:endParaRPr lang="en-US"/>
           </a:p>
@@ -2135,7 +2237,7 @@
           <a:p>
             <a:fld id="{6FC2E1BB-ABA2-49E9-A8D9-545C2DE0A0F4}" type="datetimeFigureOut">
               <a:rPr lang="en-US" smtClean="0"/>
-              <a:t>1/27/2025</a:t>
+              <a:t>1/28/2025</a:t>
             </a:fld>
             <a:endParaRPr lang="en-US"/>
           </a:p>
@@ -2410,7 +2512,7 @@
           <a:p>
             <a:fld id="{6FC2E1BB-ABA2-49E9-A8D9-545C2DE0A0F4}" type="datetimeFigureOut">
               <a:rPr lang="en-US" smtClean="0"/>
-              <a:t>1/27/2025</a:t>
+              <a:t>1/28/2025</a:t>
             </a:fld>
             <a:endParaRPr lang="en-US"/>
           </a:p>
@@ -2675,7 +2777,7 @@
           <a:p>
             <a:fld id="{6FC2E1BB-ABA2-49E9-A8D9-545C2DE0A0F4}" type="datetimeFigureOut">
               <a:rPr lang="en-US" smtClean="0"/>
-              <a:t>1/27/2025</a:t>
+              <a:t>1/28/2025</a:t>
             </a:fld>
             <a:endParaRPr lang="en-US"/>
           </a:p>
@@ -3087,7 +3189,7 @@
           <a:p>
             <a:fld id="{6FC2E1BB-ABA2-49E9-A8D9-545C2DE0A0F4}" type="datetimeFigureOut">
               <a:rPr lang="en-US" smtClean="0"/>
-              <a:t>1/27/2025</a:t>
+              <a:t>1/28/2025</a:t>
             </a:fld>
             <a:endParaRPr lang="en-US"/>
           </a:p>
@@ -3228,7 +3330,7 @@
           <a:p>
             <a:fld id="{6FC2E1BB-ABA2-49E9-A8D9-545C2DE0A0F4}" type="datetimeFigureOut">
               <a:rPr lang="en-US" smtClean="0"/>
-              <a:t>1/27/2025</a:t>
+              <a:t>1/28/2025</a:t>
             </a:fld>
             <a:endParaRPr lang="en-US"/>
           </a:p>
@@ -3341,7 +3443,7 @@
           <a:p>
             <a:fld id="{6FC2E1BB-ABA2-49E9-A8D9-545C2DE0A0F4}" type="datetimeFigureOut">
               <a:rPr lang="en-US" smtClean="0"/>
-              <a:t>1/27/2025</a:t>
+              <a:t>1/28/2025</a:t>
             </a:fld>
             <a:endParaRPr lang="en-US"/>
           </a:p>
@@ -3652,7 +3754,7 @@
           <a:p>
             <a:fld id="{6FC2E1BB-ABA2-49E9-A8D9-545C2DE0A0F4}" type="datetimeFigureOut">
               <a:rPr lang="en-US" smtClean="0"/>
-              <a:t>1/27/2025</a:t>
+              <a:t>1/28/2025</a:t>
             </a:fld>
             <a:endParaRPr lang="en-US"/>
           </a:p>
@@ -3940,7 +4042,7 @@
           <a:p>
             <a:fld id="{6FC2E1BB-ABA2-49E9-A8D9-545C2DE0A0F4}" type="datetimeFigureOut">
               <a:rPr lang="en-US" smtClean="0"/>
-              <a:t>1/27/2025</a:t>
+              <a:t>1/28/2025</a:t>
             </a:fld>
             <a:endParaRPr lang="en-US"/>
           </a:p>
@@ -4211,7 +4313,7 @@
           <a:p>
             <a:fld id="{6FC2E1BB-ABA2-49E9-A8D9-545C2DE0A0F4}" type="datetimeFigureOut">
               <a:rPr lang="en-US" smtClean="0"/>
-              <a:t>1/27/2025</a:t>
+              <a:t>1/28/2025</a:t>
             </a:fld>
             <a:endParaRPr lang="en-US"/>
           </a:p>
@@ -6358,10 +6460,10 @@
       </p:sp>
       <p:pic>
         <p:nvPicPr>
-          <p:cNvPr id="4" name="Picture 3" descr="A diagram of a program&#10;&#10;Description automatically generated">
-            <a:extLst>
-              <a:ext uri="{FF2B5EF4-FFF2-40B4-BE49-F238E27FC236}">
-                <a16:creationId xmlns:a16="http://schemas.microsoft.com/office/drawing/2014/main" id="{6543A864-BBBE-6CBB-E5C9-791084471BA7}"/>
+          <p:cNvPr id="6" name="Picture 5" descr="A diagram of a program&#10;&#10;Description automatically generated">
+            <a:extLst>
+              <a:ext uri="{FF2B5EF4-FFF2-40B4-BE49-F238E27FC236}">
+                <a16:creationId xmlns:a16="http://schemas.microsoft.com/office/drawing/2014/main" id="{DD07DE7C-06F2-2632-7688-C1A81AC8613A}"/>
               </a:ext>
             </a:extLst>
           </p:cNvPr>
@@ -6384,8 +6486,8 @@
         </p:blipFill>
         <p:spPr>
           <a:xfrm>
-            <a:off x="8039099" y="276224"/>
-            <a:ext cx="3813003" cy="6426325"/>
+            <a:off x="8091192" y="258805"/>
+            <a:ext cx="3673158" cy="6340389"/>
           </a:xfrm>
           <a:prstGeom prst="rect">
             <a:avLst/>
@@ -8330,7 +8432,7 @@
             </a:r>
             <a:r>
               <a:rPr lang="en-US" dirty="0">
-                <a:hlinkClick r:id="rId2"/>
+                <a:hlinkClick r:id="rId3"/>
               </a:rPr>
               <a:t>Graph-Embedding</a:t>
             </a:r>
@@ -8451,10 +8553,47 @@
             </a:r>
           </a:p>
           <a:p>
-            <a:pPr marL="0" indent="0">
-              <a:buNone/>
-            </a:pPr>
-            <a:endParaRPr lang="en-US" dirty="0"/>
+            <a:r>
+              <a:rPr lang="en-US" b="0" i="0" dirty="0">
+                <a:solidFill>
+                  <a:srgbClr val="1F2328"/>
+                </a:solidFill>
+                <a:effectLst/>
+                <a:latin typeface="-apple-system"/>
+                <a:hlinkClick r:id="rId4"/>
+              </a:rPr>
+              <a:t>Deep Walk and Node2Vec: Graph Embeddings</a:t>
+            </a:r>
+            <a:r>
+              <a:rPr lang="en-US" b="0" i="0" dirty="0">
+                <a:solidFill>
+                  <a:srgbClr val="1F2328"/>
+                </a:solidFill>
+                <a:effectLst/>
+                <a:latin typeface="-apple-system"/>
+              </a:rPr>
+              <a:t>, Tejpal Kumawat, medium, 2023</a:t>
+            </a:r>
+          </a:p>
+          <a:p>
+            <a:r>
+              <a:rPr lang="en-US" dirty="0">
+                <a:hlinkClick r:id="rId5"/>
+              </a:rPr>
+              <a:t>Skip-Gram Word2Vec Algorithm</a:t>
+            </a:r>
+            <a:r>
+              <a:rPr lang="en-US" dirty="0"/>
+              <a:t>, Ido </a:t>
+            </a:r>
+            <a:r>
+              <a:rPr lang="en-US" dirty="0" err="1"/>
+              <a:t>Leshem</a:t>
+            </a:r>
+            <a:r>
+              <a:rPr lang="en-US" dirty="0"/>
+              <a:t>, medium, 2023</a:t>
+            </a:r>
           </a:p>
           <a:p>
             <a:endParaRPr lang="en-US" dirty="0"/>

</xml_diff>

<commit_message>
moved overlapped image and title
</commit_message>
<xml_diff>
--- a/doc/Graph-Embedding Presentation.pptx
+++ b/doc/Graph-Embedding Presentation.pptx
@@ -5011,42 +5011,9 @@
               <a:buNone/>
             </a:pPr>
             <a:r>
-              <a:rPr lang="en-US" sz="2400" dirty="0" smtClean="0"/>
-              <a:t>Each </a:t>
-            </a:r>
-            <a:r>
               <a:rPr lang="en-US" sz="2400" dirty="0"/>
-              <a:t>vertex and edge </a:t>
-            </a:r>
-            <a:r>
-              <a:rPr lang="en-US" sz="2400" dirty="0" smtClean="0"/>
-              <a:t>is given a </a:t>
-            </a:r>
-            <a:r>
-              <a:rPr lang="en-US" sz="2400" dirty="0"/>
-              <a:t>weight value </a:t>
-            </a:r>
-            <a:r>
-              <a:rPr lang="en-US" sz="2400" dirty="0" smtClean="0"/>
-              <a:t>in range of </a:t>
-            </a:r>
-            <a:r>
-              <a:rPr lang="en-US" sz="2400" dirty="0"/>
-              <a:t>[0,1]</a:t>
-            </a:r>
-            <a:r>
-              <a:rPr lang="en-US" sz="2400" dirty="0" smtClean="0"/>
-              <a:t> </a:t>
-            </a:r>
-            <a:r>
-              <a:rPr lang="en-US" sz="2400" dirty="0"/>
-              <a:t>based on its </a:t>
-            </a:r>
-            <a:r>
-              <a:rPr lang="en-US" sz="2400" dirty="0" smtClean="0"/>
-              <a:t>neighbors. </a:t>
-            </a:r>
-            <a:endParaRPr lang="en-US" sz="2400" dirty="0"/>
+              <a:t>Each vertex and edge is given a weight value in range of [0,1] based on its neighbors. </a:t>
+            </a:r>
           </a:p>
         </p:txBody>
       </p:sp>
@@ -5856,13 +5823,6 @@
             <a:pPr marL="0" indent="0" algn="l" fontAlgn="base">
               <a:buNone/>
             </a:pPr>
-            <a:r>
-              <a:rPr lang="en-US" b="0" i="0" dirty="0">
-                <a:effectLst/>
-                <a:latin typeface="gg sans"/>
-              </a:rPr>
-              <a:t/>
-            </a:r>
             <a:br>
               <a:rPr lang="en-US" b="0" i="0" dirty="0">
                 <a:effectLst/>
@@ -7385,8 +7345,8 @@
         </p:blipFill>
         <p:spPr>
           <a:xfrm>
-            <a:off x="3866355" y="662781"/>
-            <a:ext cx="2616658" cy="1686291"/>
+            <a:off x="4954555" y="1009847"/>
+            <a:ext cx="2144277" cy="1381868"/>
           </a:xfrm>
           <a:prstGeom prst="rect">
             <a:avLst/>
@@ -7683,8 +7643,8 @@
         </p:blipFill>
         <p:spPr>
           <a:xfrm>
-            <a:off x="4631733" y="600591"/>
-            <a:ext cx="2256149" cy="1453963"/>
+            <a:off x="5346550" y="946079"/>
+            <a:ext cx="1784037" cy="1149713"/>
           </a:xfrm>
           <a:prstGeom prst="rect">
             <a:avLst/>
@@ -8610,7 +8570,6 @@
               <a:rPr lang="en-US" dirty="0"/>
               <a:t>Which is excellent!</a:t>
             </a:r>
-            <a:endParaRPr lang="en-US" dirty="0"/>
           </a:p>
         </p:txBody>
       </p:sp>
@@ -10519,7 +10478,7 @@
         </p:nvGraphicFramePr>
         <p:xfrm>
           <a:off x="1231900" y="3998790"/>
-          <a:ext cx="9621355" cy="1020690"/>
+          <a:ext cx="9621355" cy="859638"/>
         </p:xfrm>
         <a:graphic>
           <a:graphicData uri="http://schemas.openxmlformats.org/drawingml/2006/table">

</xml_diff>

<commit_message>
final touches before submit
</commit_message>
<xml_diff>
--- a/doc/Graph-Embedding Presentation.pptx
+++ b/doc/Graph-Embedding Presentation.pptx
@@ -217,7 +217,7 @@
           <a:p>
             <a:fld id="{40255490-F3EC-4464-B815-288EE6CB06A0}" type="datetimeFigureOut">
               <a:rPr lang="en-US" smtClean="0"/>
-              <a:t>1/28/2025</a:t>
+              <a:t>1/30/2025</a:t>
             </a:fld>
             <a:endParaRPr lang="en-US"/>
           </a:p>
@@ -731,6 +731,50 @@
               </a:rPr>
               <a:t>alias explaining later</a:t>
             </a:r>
+          </a:p>
+          <a:p>
+            <a:r>
+              <a:rPr lang="en-US" b="0" i="0" dirty="0">
+                <a:effectLst/>
+                <a:latin typeface="gg sans"/>
+              </a:rPr>
+              <a:t>1/p if </a:t>
+            </a:r>
+            <a:r>
+              <a:rPr lang="en-US" b="0" i="0" dirty="0" err="1">
+                <a:effectLst/>
+                <a:latin typeface="gg sans"/>
+              </a:rPr>
+              <a:t>nei</a:t>
+            </a:r>
+            <a:r>
+              <a:rPr lang="en-US" b="0" i="0" dirty="0">
+                <a:effectLst/>
+                <a:latin typeface="gg sans"/>
+              </a:rPr>
+              <a:t>=</a:t>
+            </a:r>
+            <a:r>
+              <a:rPr lang="en-US" b="0" i="0" dirty="0" err="1">
+                <a:effectLst/>
+                <a:latin typeface="gg sans"/>
+              </a:rPr>
+              <a:t>src</a:t>
+            </a:r>
+            <a:r>
+              <a:rPr lang="en-US" b="0" i="0" dirty="0">
+                <a:effectLst/>
+                <a:latin typeface="gg sans"/>
+              </a:rPr>
+              <a:t> 1/q if not connected, </a:t>
+            </a:r>
+            <a:r>
+              <a:rPr lang="en-US" b="0" i="0">
+                <a:effectLst/>
+                <a:latin typeface="gg sans"/>
+              </a:rPr>
+              <a:t>else normal</a:t>
+            </a:r>
             <a:endParaRPr lang="en-US" dirty="0"/>
           </a:p>
         </p:txBody>
@@ -1633,7 +1677,7 @@
           <a:p>
             <a:fld id="{6FC2E1BB-ABA2-49E9-A8D9-545C2DE0A0F4}" type="datetimeFigureOut">
               <a:rPr lang="en-US" smtClean="0"/>
-              <a:t>1/28/2025</a:t>
+              <a:t>1/30/2025</a:t>
             </a:fld>
             <a:endParaRPr lang="en-US"/>
           </a:p>
@@ -1831,7 +1875,7 @@
           <a:p>
             <a:fld id="{6FC2E1BB-ABA2-49E9-A8D9-545C2DE0A0F4}" type="datetimeFigureOut">
               <a:rPr lang="en-US" smtClean="0"/>
-              <a:t>1/28/2025</a:t>
+              <a:t>1/30/2025</a:t>
             </a:fld>
             <a:endParaRPr lang="en-US"/>
           </a:p>
@@ -2039,7 +2083,7 @@
           <a:p>
             <a:fld id="{6FC2E1BB-ABA2-49E9-A8D9-545C2DE0A0F4}" type="datetimeFigureOut">
               <a:rPr lang="en-US" smtClean="0"/>
-              <a:t>1/28/2025</a:t>
+              <a:t>1/30/2025</a:t>
             </a:fld>
             <a:endParaRPr lang="en-US"/>
           </a:p>
@@ -2237,7 +2281,7 @@
           <a:p>
             <a:fld id="{6FC2E1BB-ABA2-49E9-A8D9-545C2DE0A0F4}" type="datetimeFigureOut">
               <a:rPr lang="en-US" smtClean="0"/>
-              <a:t>1/28/2025</a:t>
+              <a:t>1/30/2025</a:t>
             </a:fld>
             <a:endParaRPr lang="en-US"/>
           </a:p>
@@ -2512,7 +2556,7 @@
           <a:p>
             <a:fld id="{6FC2E1BB-ABA2-49E9-A8D9-545C2DE0A0F4}" type="datetimeFigureOut">
               <a:rPr lang="en-US" smtClean="0"/>
-              <a:t>1/28/2025</a:t>
+              <a:t>1/30/2025</a:t>
             </a:fld>
             <a:endParaRPr lang="en-US"/>
           </a:p>
@@ -2777,7 +2821,7 @@
           <a:p>
             <a:fld id="{6FC2E1BB-ABA2-49E9-A8D9-545C2DE0A0F4}" type="datetimeFigureOut">
               <a:rPr lang="en-US" smtClean="0"/>
-              <a:t>1/28/2025</a:t>
+              <a:t>1/30/2025</a:t>
             </a:fld>
             <a:endParaRPr lang="en-US"/>
           </a:p>
@@ -3189,7 +3233,7 @@
           <a:p>
             <a:fld id="{6FC2E1BB-ABA2-49E9-A8D9-545C2DE0A0F4}" type="datetimeFigureOut">
               <a:rPr lang="en-US" smtClean="0"/>
-              <a:t>1/28/2025</a:t>
+              <a:t>1/30/2025</a:t>
             </a:fld>
             <a:endParaRPr lang="en-US"/>
           </a:p>
@@ -3330,7 +3374,7 @@
           <a:p>
             <a:fld id="{6FC2E1BB-ABA2-49E9-A8D9-545C2DE0A0F4}" type="datetimeFigureOut">
               <a:rPr lang="en-US" smtClean="0"/>
-              <a:t>1/28/2025</a:t>
+              <a:t>1/30/2025</a:t>
             </a:fld>
             <a:endParaRPr lang="en-US"/>
           </a:p>
@@ -3443,7 +3487,7 @@
           <a:p>
             <a:fld id="{6FC2E1BB-ABA2-49E9-A8D9-545C2DE0A0F4}" type="datetimeFigureOut">
               <a:rPr lang="en-US" smtClean="0"/>
-              <a:t>1/28/2025</a:t>
+              <a:t>1/30/2025</a:t>
             </a:fld>
             <a:endParaRPr lang="en-US"/>
           </a:p>
@@ -3754,7 +3798,7 @@
           <a:p>
             <a:fld id="{6FC2E1BB-ABA2-49E9-A8D9-545C2DE0A0F4}" type="datetimeFigureOut">
               <a:rPr lang="en-US" smtClean="0"/>
-              <a:t>1/28/2025</a:t>
+              <a:t>1/30/2025</a:t>
             </a:fld>
             <a:endParaRPr lang="en-US"/>
           </a:p>
@@ -4042,7 +4086,7 @@
           <a:p>
             <a:fld id="{6FC2E1BB-ABA2-49E9-A8D9-545C2DE0A0F4}" type="datetimeFigureOut">
               <a:rPr lang="en-US" smtClean="0"/>
-              <a:t>1/28/2025</a:t>
+              <a:t>1/30/2025</a:t>
             </a:fld>
             <a:endParaRPr lang="en-US"/>
           </a:p>
@@ -4313,7 +4357,7 @@
           <a:p>
             <a:fld id="{6FC2E1BB-ABA2-49E9-A8D9-545C2DE0A0F4}" type="datetimeFigureOut">
               <a:rPr lang="en-US" smtClean="0"/>
-              <a:t>1/28/2025</a:t>
+              <a:t>1/30/2025</a:t>
             </a:fld>
             <a:endParaRPr lang="en-US"/>
           </a:p>
@@ -5012,7 +5056,25 @@
             </a:pPr>
             <a:r>
               <a:rPr lang="en-US" sz="2400" dirty="0"/>
-              <a:t>Each vertex and edge is given a weight value in range of [0,1] based on its neighbors. </a:t>
+              <a:t>Each vertex and edge are given a weight value in range of [0,1]</a:t>
+            </a:r>
+          </a:p>
+          <a:p>
+            <a:pPr marL="0" indent="0">
+              <a:buNone/>
+            </a:pPr>
+            <a:r>
+              <a:rPr lang="en-US" sz="2400" dirty="0"/>
+              <a:t>Vertexes – Based on a discrete probability distribution</a:t>
+            </a:r>
+          </a:p>
+          <a:p>
+            <a:pPr marL="0" indent="0">
+              <a:buNone/>
+            </a:pPr>
+            <a:r>
+              <a:rPr lang="en-US" sz="2400" dirty="0"/>
+              <a:t>Edges - based on its neighbors and on biased random walk. </a:t>
             </a:r>
           </a:p>
         </p:txBody>
@@ -5259,8 +5321,8 @@
         </p:blipFill>
         <p:spPr>
           <a:xfrm>
-            <a:off x="7775428" y="106931"/>
-            <a:ext cx="4251255" cy="2641485"/>
+            <a:off x="8195771" y="102111"/>
+            <a:ext cx="3946373" cy="2452049"/>
           </a:xfrm>
           <a:prstGeom prst="rect">
             <a:avLst/>
@@ -5347,10 +5409,9 @@
           <a:lstStyle/>
           <a:p>
             <a:r>
-              <a:rPr lang="en-US" dirty="0" err="1"/>
+              <a:rPr lang="en-US" dirty="0"/>
               <a:t>DeepWalk</a:t>
             </a:r>
-            <a:endParaRPr lang="en-US" dirty="0"/>
           </a:p>
           <a:p>
             <a:r>
@@ -5537,12 +5598,8 @@
           <a:lstStyle/>
           <a:p>
             <a:r>
-              <a:rPr lang="en-US" dirty="0" err="1"/>
-              <a:t>DeepWalk</a:t>
-            </a:r>
-            <a:r>
               <a:rPr lang="en-US" dirty="0"/>
-              <a:t> Model</a:t>
+              <a:t>DeepWalk Model</a:t>
             </a:r>
           </a:p>
         </p:txBody>
@@ -5572,7 +5629,7 @@
         </p:spPr>
         <p:txBody>
           <a:bodyPr vert="horz" lIns="91440" tIns="45720" rIns="91440" bIns="45720" rtlCol="0">
-            <a:normAutofit fontScale="92500" lnSpcReduction="10000"/>
+            <a:normAutofit fontScale="77500" lnSpcReduction="20000"/>
           </a:bodyPr>
           <a:lstStyle>
             <a:lvl1pPr marL="228600" indent="-228600" algn="l" defTabSz="914400" rtl="0" eaLnBrk="1" latinLnBrk="0" hangingPunct="1">
@@ -5743,7 +5800,7 @@
               <a:buNone/>
             </a:pPr>
             <a:r>
-              <a:rPr lang="en-US" b="1" i="0" dirty="0" err="1">
+              <a:rPr lang="en-US" b="1" i="0" dirty="0">
                 <a:solidFill>
                   <a:srgbClr val="000000"/>
                 </a:solidFill>
@@ -5760,63 +5817,7 @@
                 <a:effectLst/>
                 <a:latin typeface="inherit"/>
               </a:rPr>
-              <a:t> is a method that learns numerical representations of graph nodes by simulating random walks to a </a:t>
-            </a:r>
-            <a:r>
-              <a:rPr lang="en-US" dirty="0">
-                <a:solidFill>
-                  <a:srgbClr val="000000"/>
-                </a:solidFill>
-                <a:latin typeface="inherit"/>
-              </a:rPr>
-              <a:t>window </a:t>
-            </a:r>
-            <a:r>
-              <a:rPr lang="en-US" b="0" i="0" dirty="0">
-                <a:solidFill>
-                  <a:srgbClr val="000000"/>
-                </a:solidFill>
-                <a:effectLst/>
-                <a:latin typeface="inherit"/>
-              </a:rPr>
-              <a:t>and uses a Skip-gram model to capture node relationships. </a:t>
-            </a:r>
-          </a:p>
-          <a:p>
-            <a:pPr marL="0" indent="0" algn="l" fontAlgn="base">
-              <a:buNone/>
-            </a:pPr>
-            <a:endParaRPr lang="en-US" b="0" i="0" dirty="0">
-              <a:solidFill>
-                <a:srgbClr val="000000"/>
-              </a:solidFill>
-              <a:effectLst/>
-              <a:latin typeface="inherit"/>
-            </a:endParaRPr>
-          </a:p>
-          <a:p>
-            <a:pPr marL="0" indent="0" algn="l" fontAlgn="base">
-              <a:buNone/>
-            </a:pPr>
-            <a:r>
-              <a:rPr lang="en-US" b="0" i="0" dirty="0">
-                <a:effectLst/>
-                <a:latin typeface="gg sans"/>
-              </a:rPr>
-              <a:t>The purpose of these walks is to create </a:t>
-            </a:r>
-            <a:br>
-              <a:rPr lang="en-US" b="0" i="0" dirty="0">
-                <a:effectLst/>
-                <a:latin typeface="gg sans"/>
-              </a:rPr>
-            </a:br>
-            <a:r>
-              <a:rPr lang="en-US" b="0" i="0" dirty="0">
-                <a:effectLst/>
-                <a:latin typeface="gg sans"/>
-              </a:rPr>
-              <a:t>sequences of nodes </a:t>
+              <a:t> is a method for learning representations of nodes in a graph. The core idea behind it is to generate random walks within the graph, which are then used to learn representations of the nodes.</a:t>
             </a:r>
           </a:p>
           <a:p>
@@ -5834,89 +5835,56 @@
                 <a:effectLst/>
                 <a:latin typeface="gg sans"/>
               </a:rPr>
-              <a:t>These sequences are used to learn node embeddings (vector representations) of the graph.</a:t>
-            </a:r>
-            <a:endParaRPr lang="en-US" dirty="0">
-              <a:solidFill>
-                <a:srgbClr val="000000"/>
-              </a:solidFill>
-              <a:latin typeface="inherit"/>
-            </a:endParaRPr>
+              <a:t>•Random Walks: DeepWalk generates a set of random walks starting from each node in the graph. A random walk is a sequence of nodes that begins at a particular node and moves to one of its neighbors at each step, revealing relationships between nearby nodes.</a:t>
+            </a:r>
           </a:p>
           <a:p>
             <a:pPr marL="0" indent="0" algn="l" fontAlgn="base">
               <a:buNone/>
             </a:pPr>
+            <a:endParaRPr lang="en-US" b="0" i="0" dirty="0">
+              <a:effectLst/>
+              <a:latin typeface="gg sans"/>
+            </a:endParaRPr>
+          </a:p>
+          <a:p>
+            <a:pPr marL="0" indent="0" algn="l" fontAlgn="base">
+              <a:buNone/>
+            </a:pPr>
+            <a:r>
+              <a:rPr lang="en-US" b="0" i="0" dirty="0">
+                <a:effectLst/>
+                <a:latin typeface="gg sans"/>
+              </a:rPr>
+              <a:t>•Word2Vec Algorithm: The random walks generated from the graph are treated as "sentences," and the nodes in the graph are treated as "words". The algorithm is applied to these random walks to learn a neural network. This network predicts the probability of a node appearing in a random walk given its neighbors in the graph.</a:t>
+            </a:r>
+          </a:p>
+          <a:p>
+            <a:pPr marL="0" indent="0" algn="l" fontAlgn="base">
+              <a:buNone/>
+            </a:pPr>
+            <a:endParaRPr lang="en-US" b="0" i="0" dirty="0">
+              <a:effectLst/>
+              <a:latin typeface="gg sans"/>
+            </a:endParaRPr>
+          </a:p>
+          <a:p>
+            <a:pPr marL="0" indent="0" algn="l" fontAlgn="base">
+              <a:buNone/>
+            </a:pPr>
+            <a:r>
+              <a:rPr lang="en-US" b="0" i="0" dirty="0">
+                <a:effectLst/>
+                <a:latin typeface="gg sans"/>
+              </a:rPr>
+              <a:t>•Local Structure: DeepWalk is effective at capturing the local structure of a graph. This allows it to learn node embeddings that reflect the immediate relationships between nodes.</a:t>
+            </a:r>
             <a:endParaRPr lang="en-US" b="0" i="0" dirty="0">
               <a:solidFill>
                 <a:srgbClr val="000000"/>
               </a:solidFill>
               <a:effectLst/>
               <a:latin typeface="inherit"/>
-            </a:endParaRPr>
-          </a:p>
-          <a:p>
-            <a:pPr marL="0" indent="0" algn="l" fontAlgn="base">
-              <a:buNone/>
-            </a:pPr>
-            <a:r>
-              <a:rPr lang="en-US" b="0" i="0" dirty="0">
-                <a:solidFill>
-                  <a:srgbClr val="000000"/>
-                </a:solidFill>
-                <a:effectLst/>
-                <a:latin typeface="inherit"/>
-              </a:rPr>
-              <a:t>For tasks like classification or clustering.</a:t>
-            </a:r>
-          </a:p>
-        </p:txBody>
-      </p:sp>
-      <p:sp>
-        <p:nvSpPr>
-          <p:cNvPr id="9" name="Rectangle 8">
-            <a:extLst>
-              <a:ext uri="{FF2B5EF4-FFF2-40B4-BE49-F238E27FC236}">
-                <a16:creationId xmlns:a16="http://schemas.microsoft.com/office/drawing/2014/main" id="{3FC3D4ED-F141-A7F3-9F6E-89D54E57E725}"/>
-              </a:ext>
-            </a:extLst>
-          </p:cNvPr>
-          <p:cNvSpPr/>
-          <p:nvPr/>
-        </p:nvSpPr>
-        <p:spPr>
-          <a:xfrm>
-            <a:off x="9213435" y="5661878"/>
-            <a:ext cx="2886490" cy="1077218"/>
-          </a:xfrm>
-          <a:prstGeom prst="rect">
-            <a:avLst/>
-          </a:prstGeom>
-          <a:noFill/>
-        </p:spPr>
-        <p:txBody>
-          <a:bodyPr wrap="square" lIns="91440" tIns="45720" rIns="91440" bIns="45720">
-            <a:spAutoFit/>
-          </a:bodyPr>
-          <a:lstStyle/>
-          <a:p>
-            <a:pPr algn="ctr"/>
-            <a:r>
-              <a:rPr lang="en-US" sz="1600" dirty="0"/>
-              <a:t> Skip-Gram - maximizes the co-occurrence probability among the words that appear within a window, w</a:t>
-            </a:r>
-            <a:endParaRPr lang="en-US" sz="1600" b="0" cap="none" spc="0" dirty="0">
-              <a:ln w="0"/>
-              <a:solidFill>
-                <a:schemeClr val="tx1"/>
-              </a:solidFill>
-              <a:effectLst>
-                <a:outerShdw blurRad="38100" dist="19050" dir="2700000" algn="tl" rotWithShape="0">
-                  <a:schemeClr val="dk1">
-                    <a:alpha val="40000"/>
-                  </a:schemeClr>
-                </a:outerShdw>
-              </a:effectLst>
             </a:endParaRPr>
           </a:p>
         </p:txBody>
@@ -6033,19 +6001,35 @@
         </p:nvSpPr>
         <p:spPr>
           <a:xfrm>
-            <a:off x="0" y="1594427"/>
-            <a:ext cx="8562108" cy="4898448"/>
+            <a:off x="221438" y="1338395"/>
+            <a:ext cx="8293264" cy="4898448"/>
           </a:xfrm>
         </p:spPr>
         <p:txBody>
           <a:bodyPr>
-            <a:normAutofit/>
+            <a:normAutofit fontScale="92500" lnSpcReduction="20000"/>
           </a:bodyPr>
           <a:lstStyle/>
           <a:p>
             <a:pPr marL="0" indent="0">
               <a:buNone/>
             </a:pPr>
+            <a:endParaRPr lang="en-US" b="1" i="0" dirty="0">
+              <a:effectLst/>
+              <a:latin typeface="gg sans"/>
+            </a:endParaRPr>
+          </a:p>
+          <a:p>
+            <a:pPr marL="0" indent="0">
+              <a:buNone/>
+            </a:pPr>
+            <a:r>
+              <a:rPr lang="en-US" i="0" dirty="0">
+                <a:effectLst/>
+                <a:latin typeface="gg sans"/>
+              </a:rPr>
+              <a:t>DFS and BFS: </a:t>
+            </a:r>
             <a:r>
               <a:rPr lang="en-US" b="1" i="0" dirty="0">
                 <a:effectLst/>
@@ -6054,11 +6038,42 @@
               <a:t>Node2Vec</a:t>
             </a:r>
             <a:r>
-              <a:rPr lang="en-US" b="0" i="0" dirty="0">
+              <a:rPr lang="en-US" i="0" dirty="0">
                 <a:effectLst/>
                 <a:latin typeface="gg sans"/>
               </a:rPr>
-              <a:t>, controls the navigation of the nodes in the random walks with two parameters p (return parameter) and q (in-out parameter) that control the bias of the random walks. </a:t>
+              <a:t> combines DFS and BFS techniques to extract random walks. This combination is controlled by two parameters, P (return parameter) and Q (in-out parameter).</a:t>
+            </a:r>
+          </a:p>
+          <a:p>
+            <a:pPr marL="0" indent="0">
+              <a:buNone/>
+            </a:pPr>
+            <a:endParaRPr lang="en-US" i="0" dirty="0">
+              <a:effectLst/>
+              <a:latin typeface="gg sans"/>
+            </a:endParaRPr>
+          </a:p>
+          <a:p>
+            <a:pPr marL="0" indent="0">
+              <a:buNone/>
+            </a:pPr>
+            <a:r>
+              <a:rPr lang="en-US" dirty="0">
+                <a:latin typeface="gg sans"/>
+              </a:rPr>
+              <a:t>Key differences:</a:t>
+            </a:r>
+          </a:p>
+          <a:p>
+            <a:pPr marL="0" indent="0">
+              <a:buNone/>
+            </a:pPr>
+            <a:r>
+              <a:rPr lang="en-US" dirty="0">
+                <a:latin typeface="gg sans"/>
+              </a:rPr>
+              <a:t>•DeepWalk uses simple random walks, while Node2Vec uses a more flexible approach with P and Q parameters to control the walk's behavior.</a:t>
             </a:r>
           </a:p>
           <a:p>
@@ -6074,11 +6089,10 @@
               <a:buNone/>
             </a:pPr>
             <a:r>
-              <a:rPr lang="en-US" b="0" i="0" dirty="0">
-                <a:effectLst/>
+              <a:rPr lang="en-US" dirty="0">
                 <a:latin typeface="gg sans"/>
               </a:rPr>
-              <a:t>This allows Node2Vec to perform biased random walks. The algorithm can switch between exploration (broadly exploring the graph) and exploitation (focusing on nearby nodes), enabling it to capture both local and global structure in the graph.</a:t>
+              <a:t>•Node2Vec combines the advantages of BFS and DFS through its sampling strategy, giving it more control over the nature of the learned representations than DeepWalk.</a:t>
             </a:r>
           </a:p>
         </p:txBody>
@@ -6097,8 +6111,8 @@
         </p:nvSpPr>
         <p:spPr>
           <a:xfrm>
-            <a:off x="8562108" y="3261457"/>
-            <a:ext cx="3694546" cy="2800767"/>
+            <a:off x="8514702" y="3199666"/>
+            <a:ext cx="3694546" cy="3293209"/>
           </a:xfrm>
           <a:prstGeom prst="rect">
             <a:avLst/>
@@ -6130,7 +6144,7 @@
                 <a:effectLst/>
                 <a:latin typeface="inherit"/>
               </a:rPr>
-              <a:t>p - controls the likelihood of revisiting the previous node in a random walk. A higher p value means the walk is less likely to return to the previous node, encouraging exploration of new nodes. </a:t>
+              <a:t>P (Return Parameter): Controls the likelihood of returning to the previous node in the walk. A high value of P makes the random walk explore further, while a low value keeps the walk localized</a:t>
             </a:r>
           </a:p>
           <a:p>
@@ -6153,7 +6167,7 @@
                 <a:effectLst/>
                 <a:latin typeface="inherit"/>
               </a:rPr>
-              <a:t>q - controls the tendency to explore nodes that are far from the starting node. Higher q value encourages the walk to explore nodes further away.</a:t>
+              <a:t>Q (In-Out Parameter): Controls the likelihood of exploring nodes further away (BFS-like behavior) or staying local (DFS-like behavior). A small value of Q promotes exploration, while a large value encourages the walk to stay local</a:t>
             </a:r>
           </a:p>
         </p:txBody>
@@ -6174,8 +6188,8 @@
         </p:blipFill>
         <p:spPr>
           <a:xfrm>
-            <a:off x="8345103" y="208346"/>
-            <a:ext cx="3625460" cy="2028863"/>
+            <a:off x="8641079" y="208346"/>
+            <a:ext cx="3329483" cy="2028863"/>
           </a:xfrm>
           <a:prstGeom prst="rect">
             <a:avLst/>
@@ -6264,7 +6278,7 @@
         </p:spPr>
         <p:txBody>
           <a:bodyPr>
-            <a:normAutofit fontScale="92500" lnSpcReduction="10000"/>
+            <a:normAutofit/>
           </a:bodyPr>
           <a:lstStyle/>
           <a:p>
@@ -6344,27 +6358,6 @@
                 </a:solidFill>
               </a:rPr>
               <a:t>// representation of each node</a:t>
-            </a:r>
-          </a:p>
-          <a:p>
-            <a:pPr lvl="1"/>
-            <a:r>
-              <a:rPr lang="en-US" dirty="0" err="1"/>
-              <a:t>skip_Gram</a:t>
-            </a:r>
-            <a:r>
-              <a:rPr lang="en-US" dirty="0"/>
-              <a:t> =1 </a:t>
-            </a:r>
-            <a:r>
-              <a:rPr lang="en-US" dirty="0">
-                <a:solidFill>
-                  <a:schemeClr val="bg1">
-                    <a:lumMod val="50000"/>
-                  </a:schemeClr>
-                </a:solidFill>
-              </a:rPr>
-              <a:t>// target word</a:t>
             </a:r>
           </a:p>
           <a:p>
@@ -6666,7 +6659,7 @@
         </p:spPr>
         <p:txBody>
           <a:bodyPr>
-            <a:normAutofit fontScale="85000" lnSpcReduction="20000"/>
+            <a:normAutofit fontScale="92500"/>
           </a:bodyPr>
           <a:lstStyle/>
           <a:p>
@@ -6679,15 +6672,7 @@
             <a:pPr lvl="1"/>
             <a:r>
               <a:rPr lang="en-US" dirty="0"/>
-              <a:t>The model uses </a:t>
-            </a:r>
-            <a:r>
-              <a:rPr lang="en-US" dirty="0" err="1"/>
-              <a:t>DeepWalk</a:t>
-            </a:r>
-            <a:r>
-              <a:rPr lang="en-US" dirty="0"/>
-              <a:t>/Node2Vec (Unsupervised models) random walks to do graph embedding and give context to each node.</a:t>
+              <a:t>The model uses DeepWalk/Node2Vec (Unsupervised models) random walks to do graph embedding and give context to each node.</a:t>
             </a:r>
           </a:p>
           <a:p>
@@ -6914,7 +6899,7 @@
         </p:spPr>
         <p:txBody>
           <a:bodyPr>
-            <a:normAutofit fontScale="85000" lnSpcReduction="20000"/>
+            <a:normAutofit lnSpcReduction="10000"/>
           </a:bodyPr>
           <a:lstStyle/>
           <a:p>
@@ -6988,13 +6973,8 @@
             </a:pPr>
             <a:r>
               <a:rPr lang="en-US" dirty="0"/>
-              <a:t>The model prints the accuracy of the </a:t>
-            </a:r>
-            <a:r>
-              <a:rPr lang="en-US" dirty="0" err="1"/>
-              <a:t>alogrithm</a:t>
-            </a:r>
-            <a:endParaRPr lang="en-US" dirty="0"/>
+              <a:t>The model prints the accuracy of the algorithm</a:t>
+            </a:r>
           </a:p>
         </p:txBody>
       </p:sp>
@@ -7243,7 +7223,7 @@
         </p:nvSpPr>
         <p:spPr>
           <a:xfrm>
-            <a:off x="1973656" y="5097102"/>
+            <a:off x="2080660" y="6451708"/>
             <a:ext cx="704661" cy="244443"/>
           </a:xfrm>
           <a:prstGeom prst="rect">
@@ -7591,7 +7571,7 @@
         </p:nvSpPr>
         <p:spPr>
           <a:xfrm>
-            <a:off x="2154725" y="5413972"/>
+            <a:off x="2203363" y="6468701"/>
             <a:ext cx="704661" cy="244443"/>
           </a:xfrm>
           <a:prstGeom prst="rect">
@@ -7760,210 +7740,8 @@
         </p:nvSpPr>
         <p:spPr>
           <a:xfrm>
-            <a:off x="8667750" y="5064125"/>
-            <a:ext cx="3200400" cy="546100"/>
-          </a:xfrm>
-          <a:prstGeom prst="rect">
-            <a:avLst/>
-          </a:prstGeom>
-        </p:spPr>
-        <p:txBody>
-          <a:bodyPr vert="horz" lIns="91440" tIns="45720" rIns="91440" bIns="45720" rtlCol="0">
-            <a:normAutofit fontScale="92500"/>
-          </a:bodyPr>
-          <a:lstStyle>
-            <a:lvl1pPr marL="228600" indent="-228600" algn="l" defTabSz="914400" rtl="0" eaLnBrk="1" latinLnBrk="0" hangingPunct="1">
-              <a:lnSpc>
-                <a:spcPct val="90000"/>
-              </a:lnSpc>
-              <a:spcBef>
-                <a:spcPts val="1000"/>
-              </a:spcBef>
-              <a:buFont typeface="Arial" panose="020B0604020202020204" pitchFamily="34" charset="0"/>
-              <a:buChar char="•"/>
-              <a:defRPr sz="2800" kern="1200">
-                <a:solidFill>
-                  <a:schemeClr val="tx1"/>
-                </a:solidFill>
-                <a:latin typeface="+mn-lt"/>
-                <a:ea typeface="+mn-ea"/>
-                <a:cs typeface="+mn-cs"/>
-              </a:defRPr>
-            </a:lvl1pPr>
-            <a:lvl2pPr marL="685800" indent="-228600" algn="l" defTabSz="914400" rtl="0" eaLnBrk="1" latinLnBrk="0" hangingPunct="1">
-              <a:lnSpc>
-                <a:spcPct val="90000"/>
-              </a:lnSpc>
-              <a:spcBef>
-                <a:spcPts val="500"/>
-              </a:spcBef>
-              <a:buFont typeface="Arial" panose="020B0604020202020204" pitchFamily="34" charset="0"/>
-              <a:buChar char="•"/>
-              <a:defRPr sz="2400" kern="1200">
-                <a:solidFill>
-                  <a:schemeClr val="tx1"/>
-                </a:solidFill>
-                <a:latin typeface="+mn-lt"/>
-                <a:ea typeface="+mn-ea"/>
-                <a:cs typeface="+mn-cs"/>
-              </a:defRPr>
-            </a:lvl2pPr>
-            <a:lvl3pPr marL="1143000" indent="-228600" algn="l" defTabSz="914400" rtl="0" eaLnBrk="1" latinLnBrk="0" hangingPunct="1">
-              <a:lnSpc>
-                <a:spcPct val="90000"/>
-              </a:lnSpc>
-              <a:spcBef>
-                <a:spcPts val="500"/>
-              </a:spcBef>
-              <a:buFont typeface="Arial" panose="020B0604020202020204" pitchFamily="34" charset="0"/>
-              <a:buChar char="•"/>
-              <a:defRPr sz="2000" kern="1200">
-                <a:solidFill>
-                  <a:schemeClr val="tx1"/>
-                </a:solidFill>
-                <a:latin typeface="+mn-lt"/>
-                <a:ea typeface="+mn-ea"/>
-                <a:cs typeface="+mn-cs"/>
-              </a:defRPr>
-            </a:lvl3pPr>
-            <a:lvl4pPr marL="1600200" indent="-228600" algn="l" defTabSz="914400" rtl="0" eaLnBrk="1" latinLnBrk="0" hangingPunct="1">
-              <a:lnSpc>
-                <a:spcPct val="90000"/>
-              </a:lnSpc>
-              <a:spcBef>
-                <a:spcPts val="500"/>
-              </a:spcBef>
-              <a:buFont typeface="Arial" panose="020B0604020202020204" pitchFamily="34" charset="0"/>
-              <a:buChar char="•"/>
-              <a:defRPr sz="1800" kern="1200">
-                <a:solidFill>
-                  <a:schemeClr val="tx1"/>
-                </a:solidFill>
-                <a:latin typeface="+mn-lt"/>
-                <a:ea typeface="+mn-ea"/>
-                <a:cs typeface="+mn-cs"/>
-              </a:defRPr>
-            </a:lvl4pPr>
-            <a:lvl5pPr marL="2057400" indent="-228600" algn="l" defTabSz="914400" rtl="0" eaLnBrk="1" latinLnBrk="0" hangingPunct="1">
-              <a:lnSpc>
-                <a:spcPct val="90000"/>
-              </a:lnSpc>
-              <a:spcBef>
-                <a:spcPts val="500"/>
-              </a:spcBef>
-              <a:buFont typeface="Arial" panose="020B0604020202020204" pitchFamily="34" charset="0"/>
-              <a:buChar char="•"/>
-              <a:defRPr sz="1800" kern="1200">
-                <a:solidFill>
-                  <a:schemeClr val="tx1"/>
-                </a:solidFill>
-                <a:latin typeface="+mn-lt"/>
-                <a:ea typeface="+mn-ea"/>
-                <a:cs typeface="+mn-cs"/>
-              </a:defRPr>
-            </a:lvl5pPr>
-            <a:lvl6pPr marL="2514600" indent="-228600" algn="l" defTabSz="914400" rtl="0" eaLnBrk="1" latinLnBrk="0" hangingPunct="1">
-              <a:lnSpc>
-                <a:spcPct val="90000"/>
-              </a:lnSpc>
-              <a:spcBef>
-                <a:spcPts val="500"/>
-              </a:spcBef>
-              <a:buFont typeface="Arial" panose="020B0604020202020204" pitchFamily="34" charset="0"/>
-              <a:buChar char="•"/>
-              <a:defRPr sz="1800" kern="1200">
-                <a:solidFill>
-                  <a:schemeClr val="tx1"/>
-                </a:solidFill>
-                <a:latin typeface="+mn-lt"/>
-                <a:ea typeface="+mn-ea"/>
-                <a:cs typeface="+mn-cs"/>
-              </a:defRPr>
-            </a:lvl6pPr>
-            <a:lvl7pPr marL="2971800" indent="-228600" algn="l" defTabSz="914400" rtl="0" eaLnBrk="1" latinLnBrk="0" hangingPunct="1">
-              <a:lnSpc>
-                <a:spcPct val="90000"/>
-              </a:lnSpc>
-              <a:spcBef>
-                <a:spcPts val="500"/>
-              </a:spcBef>
-              <a:buFont typeface="Arial" panose="020B0604020202020204" pitchFamily="34" charset="0"/>
-              <a:buChar char="•"/>
-              <a:defRPr sz="1800" kern="1200">
-                <a:solidFill>
-                  <a:schemeClr val="tx1"/>
-                </a:solidFill>
-                <a:latin typeface="+mn-lt"/>
-                <a:ea typeface="+mn-ea"/>
-                <a:cs typeface="+mn-cs"/>
-              </a:defRPr>
-            </a:lvl7pPr>
-            <a:lvl8pPr marL="3429000" indent="-228600" algn="l" defTabSz="914400" rtl="0" eaLnBrk="1" latinLnBrk="0" hangingPunct="1">
-              <a:lnSpc>
-                <a:spcPct val="90000"/>
-              </a:lnSpc>
-              <a:spcBef>
-                <a:spcPts val="500"/>
-              </a:spcBef>
-              <a:buFont typeface="Arial" panose="020B0604020202020204" pitchFamily="34" charset="0"/>
-              <a:buChar char="•"/>
-              <a:defRPr sz="1800" kern="1200">
-                <a:solidFill>
-                  <a:schemeClr val="tx1"/>
-                </a:solidFill>
-                <a:latin typeface="+mn-lt"/>
-                <a:ea typeface="+mn-ea"/>
-                <a:cs typeface="+mn-cs"/>
-              </a:defRPr>
-            </a:lvl8pPr>
-            <a:lvl9pPr marL="3886200" indent="-228600" algn="l" defTabSz="914400" rtl="0" eaLnBrk="1" latinLnBrk="0" hangingPunct="1">
-              <a:lnSpc>
-                <a:spcPct val="90000"/>
-              </a:lnSpc>
-              <a:spcBef>
-                <a:spcPts val="500"/>
-              </a:spcBef>
-              <a:buFont typeface="Arial" panose="020B0604020202020204" pitchFamily="34" charset="0"/>
-              <a:buChar char="•"/>
-              <a:defRPr sz="1800" kern="1200">
-                <a:solidFill>
-                  <a:schemeClr val="tx1"/>
-                </a:solidFill>
-                <a:latin typeface="+mn-lt"/>
-                <a:ea typeface="+mn-ea"/>
-                <a:cs typeface="+mn-cs"/>
-              </a:defRPr>
-            </a:lvl9pPr>
-          </a:lstStyle>
-          <a:p>
-            <a:pPr marL="0" indent="0">
-              <a:buNone/>
-            </a:pPr>
-            <a:r>
-              <a:rPr lang="en-US" dirty="0"/>
-              <a:t>Shahar Berenson</a:t>
-            </a:r>
-          </a:p>
-        </p:txBody>
-      </p:sp>
-      <p:sp>
-        <p:nvSpPr>
-          <p:cNvPr id="14" name="Content Placeholder 2">
-            <a:extLst>
-              <a:ext uri="{FF2B5EF4-FFF2-40B4-BE49-F238E27FC236}">
-                <a16:creationId xmlns:a16="http://schemas.microsoft.com/office/drawing/2014/main" id="{B2213C64-90B9-B5D0-3CC9-59842F70DD4A}"/>
-              </a:ext>
-            </a:extLst>
-          </p:cNvPr>
-          <p:cNvSpPr txBox="1">
-            <a:spLocks/>
-          </p:cNvSpPr>
-          <p:nvPr/>
-        </p:nvSpPr>
-        <p:spPr>
-          <a:xfrm>
-            <a:off x="4953000" y="5064125"/>
-            <a:ext cx="3200400" cy="546100"/>
+            <a:off x="8637173" y="5064125"/>
+            <a:ext cx="2846226" cy="546100"/>
           </a:xfrm>
           <a:prstGeom prst="rect">
             <a:avLst/>
@@ -8143,17 +7921,17 @@
             </a:pPr>
             <a:r>
               <a:rPr lang="en-US" dirty="0"/>
-              <a:t>Omer Goldstein</a:t>
-            </a:r>
-          </a:p>
-        </p:txBody>
-      </p:sp>
-      <p:sp>
-        <p:nvSpPr>
-          <p:cNvPr id="15" name="Content Placeholder 2">
-            <a:extLst>
-              <a:ext uri="{FF2B5EF4-FFF2-40B4-BE49-F238E27FC236}">
-                <a16:creationId xmlns:a16="http://schemas.microsoft.com/office/drawing/2014/main" id="{04AACD0C-69F3-17BD-4395-A2F75D71FAB9}"/>
+              <a:t>Shahar Berenson</a:t>
+            </a:r>
+          </a:p>
+        </p:txBody>
+      </p:sp>
+      <p:sp>
+        <p:nvSpPr>
+          <p:cNvPr id="14" name="Content Placeholder 2">
+            <a:extLst>
+              <a:ext uri="{FF2B5EF4-FFF2-40B4-BE49-F238E27FC236}">
+                <a16:creationId xmlns:a16="http://schemas.microsoft.com/office/drawing/2014/main" id="{B2213C64-90B9-B5D0-3CC9-59842F70DD4A}"/>
               </a:ext>
             </a:extLst>
           </p:cNvPr>
@@ -8164,8 +7942,8 @@
         </p:nvSpPr>
         <p:spPr>
           <a:xfrm>
-            <a:off x="912262" y="5064125"/>
-            <a:ext cx="3200400" cy="546100"/>
+            <a:off x="4910370" y="5064125"/>
+            <a:ext cx="2623457" cy="546100"/>
           </a:xfrm>
           <a:prstGeom prst="rect">
             <a:avLst/>
@@ -8345,6 +8123,208 @@
             </a:pPr>
             <a:r>
               <a:rPr lang="en-US" dirty="0"/>
+              <a:t>Omer Goldstein</a:t>
+            </a:r>
+          </a:p>
+        </p:txBody>
+      </p:sp>
+      <p:sp>
+        <p:nvSpPr>
+          <p:cNvPr id="15" name="Content Placeholder 2">
+            <a:extLst>
+              <a:ext uri="{FF2B5EF4-FFF2-40B4-BE49-F238E27FC236}">
+                <a16:creationId xmlns:a16="http://schemas.microsoft.com/office/drawing/2014/main" id="{04AACD0C-69F3-17BD-4395-A2F75D71FAB9}"/>
+              </a:ext>
+            </a:extLst>
+          </p:cNvPr>
+          <p:cNvSpPr txBox="1">
+            <a:spLocks/>
+          </p:cNvSpPr>
+          <p:nvPr/>
+        </p:nvSpPr>
+        <p:spPr>
+          <a:xfrm>
+            <a:off x="931952" y="5064125"/>
+            <a:ext cx="2623457" cy="546100"/>
+          </a:xfrm>
+          <a:prstGeom prst="rect">
+            <a:avLst/>
+          </a:prstGeom>
+        </p:spPr>
+        <p:txBody>
+          <a:bodyPr vert="horz" lIns="91440" tIns="45720" rIns="91440" bIns="45720" rtlCol="0">
+            <a:normAutofit/>
+          </a:bodyPr>
+          <a:lstStyle>
+            <a:lvl1pPr marL="228600" indent="-228600" algn="l" defTabSz="914400" rtl="0" eaLnBrk="1" latinLnBrk="0" hangingPunct="1">
+              <a:lnSpc>
+                <a:spcPct val="90000"/>
+              </a:lnSpc>
+              <a:spcBef>
+                <a:spcPts val="1000"/>
+              </a:spcBef>
+              <a:buFont typeface="Arial" panose="020B0604020202020204" pitchFamily="34" charset="0"/>
+              <a:buChar char="•"/>
+              <a:defRPr sz="2800" kern="1200">
+                <a:solidFill>
+                  <a:schemeClr val="tx1"/>
+                </a:solidFill>
+                <a:latin typeface="+mn-lt"/>
+                <a:ea typeface="+mn-ea"/>
+                <a:cs typeface="+mn-cs"/>
+              </a:defRPr>
+            </a:lvl1pPr>
+            <a:lvl2pPr marL="685800" indent="-228600" algn="l" defTabSz="914400" rtl="0" eaLnBrk="1" latinLnBrk="0" hangingPunct="1">
+              <a:lnSpc>
+                <a:spcPct val="90000"/>
+              </a:lnSpc>
+              <a:spcBef>
+                <a:spcPts val="500"/>
+              </a:spcBef>
+              <a:buFont typeface="Arial" panose="020B0604020202020204" pitchFamily="34" charset="0"/>
+              <a:buChar char="•"/>
+              <a:defRPr sz="2400" kern="1200">
+                <a:solidFill>
+                  <a:schemeClr val="tx1"/>
+                </a:solidFill>
+                <a:latin typeface="+mn-lt"/>
+                <a:ea typeface="+mn-ea"/>
+                <a:cs typeface="+mn-cs"/>
+              </a:defRPr>
+            </a:lvl2pPr>
+            <a:lvl3pPr marL="1143000" indent="-228600" algn="l" defTabSz="914400" rtl="0" eaLnBrk="1" latinLnBrk="0" hangingPunct="1">
+              <a:lnSpc>
+                <a:spcPct val="90000"/>
+              </a:lnSpc>
+              <a:spcBef>
+                <a:spcPts val="500"/>
+              </a:spcBef>
+              <a:buFont typeface="Arial" panose="020B0604020202020204" pitchFamily="34" charset="0"/>
+              <a:buChar char="•"/>
+              <a:defRPr sz="2000" kern="1200">
+                <a:solidFill>
+                  <a:schemeClr val="tx1"/>
+                </a:solidFill>
+                <a:latin typeface="+mn-lt"/>
+                <a:ea typeface="+mn-ea"/>
+                <a:cs typeface="+mn-cs"/>
+              </a:defRPr>
+            </a:lvl3pPr>
+            <a:lvl4pPr marL="1600200" indent="-228600" algn="l" defTabSz="914400" rtl="0" eaLnBrk="1" latinLnBrk="0" hangingPunct="1">
+              <a:lnSpc>
+                <a:spcPct val="90000"/>
+              </a:lnSpc>
+              <a:spcBef>
+                <a:spcPts val="500"/>
+              </a:spcBef>
+              <a:buFont typeface="Arial" panose="020B0604020202020204" pitchFamily="34" charset="0"/>
+              <a:buChar char="•"/>
+              <a:defRPr sz="1800" kern="1200">
+                <a:solidFill>
+                  <a:schemeClr val="tx1"/>
+                </a:solidFill>
+                <a:latin typeface="+mn-lt"/>
+                <a:ea typeface="+mn-ea"/>
+                <a:cs typeface="+mn-cs"/>
+              </a:defRPr>
+            </a:lvl4pPr>
+            <a:lvl5pPr marL="2057400" indent="-228600" algn="l" defTabSz="914400" rtl="0" eaLnBrk="1" latinLnBrk="0" hangingPunct="1">
+              <a:lnSpc>
+                <a:spcPct val="90000"/>
+              </a:lnSpc>
+              <a:spcBef>
+                <a:spcPts val="500"/>
+              </a:spcBef>
+              <a:buFont typeface="Arial" panose="020B0604020202020204" pitchFamily="34" charset="0"/>
+              <a:buChar char="•"/>
+              <a:defRPr sz="1800" kern="1200">
+                <a:solidFill>
+                  <a:schemeClr val="tx1"/>
+                </a:solidFill>
+                <a:latin typeface="+mn-lt"/>
+                <a:ea typeface="+mn-ea"/>
+                <a:cs typeface="+mn-cs"/>
+              </a:defRPr>
+            </a:lvl5pPr>
+            <a:lvl6pPr marL="2514600" indent="-228600" algn="l" defTabSz="914400" rtl="0" eaLnBrk="1" latinLnBrk="0" hangingPunct="1">
+              <a:lnSpc>
+                <a:spcPct val="90000"/>
+              </a:lnSpc>
+              <a:spcBef>
+                <a:spcPts val="500"/>
+              </a:spcBef>
+              <a:buFont typeface="Arial" panose="020B0604020202020204" pitchFamily="34" charset="0"/>
+              <a:buChar char="•"/>
+              <a:defRPr sz="1800" kern="1200">
+                <a:solidFill>
+                  <a:schemeClr val="tx1"/>
+                </a:solidFill>
+                <a:latin typeface="+mn-lt"/>
+                <a:ea typeface="+mn-ea"/>
+                <a:cs typeface="+mn-cs"/>
+              </a:defRPr>
+            </a:lvl6pPr>
+            <a:lvl7pPr marL="2971800" indent="-228600" algn="l" defTabSz="914400" rtl="0" eaLnBrk="1" latinLnBrk="0" hangingPunct="1">
+              <a:lnSpc>
+                <a:spcPct val="90000"/>
+              </a:lnSpc>
+              <a:spcBef>
+                <a:spcPts val="500"/>
+              </a:spcBef>
+              <a:buFont typeface="Arial" panose="020B0604020202020204" pitchFamily="34" charset="0"/>
+              <a:buChar char="•"/>
+              <a:defRPr sz="1800" kern="1200">
+                <a:solidFill>
+                  <a:schemeClr val="tx1"/>
+                </a:solidFill>
+                <a:latin typeface="+mn-lt"/>
+                <a:ea typeface="+mn-ea"/>
+                <a:cs typeface="+mn-cs"/>
+              </a:defRPr>
+            </a:lvl7pPr>
+            <a:lvl8pPr marL="3429000" indent="-228600" algn="l" defTabSz="914400" rtl="0" eaLnBrk="1" latinLnBrk="0" hangingPunct="1">
+              <a:lnSpc>
+                <a:spcPct val="90000"/>
+              </a:lnSpc>
+              <a:spcBef>
+                <a:spcPts val="500"/>
+              </a:spcBef>
+              <a:buFont typeface="Arial" panose="020B0604020202020204" pitchFamily="34" charset="0"/>
+              <a:buChar char="•"/>
+              <a:defRPr sz="1800" kern="1200">
+                <a:solidFill>
+                  <a:schemeClr val="tx1"/>
+                </a:solidFill>
+                <a:latin typeface="+mn-lt"/>
+                <a:ea typeface="+mn-ea"/>
+                <a:cs typeface="+mn-cs"/>
+              </a:defRPr>
+            </a:lvl8pPr>
+            <a:lvl9pPr marL="3886200" indent="-228600" algn="l" defTabSz="914400" rtl="0" eaLnBrk="1" latinLnBrk="0" hangingPunct="1">
+              <a:lnSpc>
+                <a:spcPct val="90000"/>
+              </a:lnSpc>
+              <a:spcBef>
+                <a:spcPts val="500"/>
+              </a:spcBef>
+              <a:buFont typeface="Arial" panose="020B0604020202020204" pitchFamily="34" charset="0"/>
+              <a:buChar char="•"/>
+              <a:defRPr sz="1800" kern="1200">
+                <a:solidFill>
+                  <a:schemeClr val="tx1"/>
+                </a:solidFill>
+                <a:latin typeface="+mn-lt"/>
+                <a:ea typeface="+mn-ea"/>
+                <a:cs typeface="+mn-cs"/>
+              </a:defRPr>
+            </a:lvl9pPr>
+          </a:lstStyle>
+          <a:p>
+            <a:pPr marL="0" indent="0">
+              <a:buNone/>
+            </a:pPr>
+            <a:r>
+              <a:rPr lang="en-US" dirty="0"/>
               <a:t>Shlomi Fridman</a:t>
             </a:r>
           </a:p>
@@ -8378,7 +8358,7 @@
         </p:blipFill>
         <p:spPr>
           <a:xfrm>
-            <a:off x="5078459" y="2501900"/>
+            <a:off x="5059797" y="2578100"/>
             <a:ext cx="2324604" cy="2341823"/>
           </a:xfrm>
           <a:prstGeom prst="rect">
@@ -8414,8 +8394,8 @@
         </p:blipFill>
         <p:spPr>
           <a:xfrm>
-            <a:off x="969412" y="2519118"/>
-            <a:ext cx="2324605" cy="2324605"/>
+            <a:off x="1081379" y="2578100"/>
+            <a:ext cx="2324605" cy="2336800"/>
           </a:xfrm>
           <a:prstGeom prst="rect">
             <a:avLst/>
@@ -8509,20 +8489,14 @@
           </a:xfrm>
         </p:spPr>
         <p:txBody>
-          <a:bodyPr/>
+          <a:bodyPr>
+            <a:normAutofit lnSpcReduction="10000"/>
+          </a:bodyPr>
           <a:lstStyle/>
           <a:p>
             <a:r>
               <a:rPr lang="en-US" dirty="0"/>
-              <a:t>The Node2Vec runs have slight better scores than </a:t>
-            </a:r>
-            <a:r>
-              <a:rPr lang="en-US" dirty="0" err="1"/>
-              <a:t>DeepWalk</a:t>
-            </a:r>
-            <a:r>
-              <a:rPr lang="en-US" dirty="0"/>
-              <a:t>.                </a:t>
+              <a:t>The Node2Vec runs have slight better scores than DeepWalk.                </a:t>
             </a:r>
             <a:r>
               <a:rPr lang="en-US" sz="2000" dirty="0"/>
@@ -8548,7 +8522,7 @@
           <a:p>
             <a:r>
               <a:rPr lang="en-US" dirty="0"/>
-              <a:t>F1 Scores in range of 65-70%</a:t>
+              <a:t>F1 scores in range of 60-70%</a:t>
             </a:r>
           </a:p>
           <a:p>
@@ -8561,14 +8535,14 @@
           <a:p>
             <a:r>
               <a:rPr lang="en-US" dirty="0"/>
-              <a:t>AUS Scores in range of 90-95%</a:t>
+              <a:t>AUC scores in range of 90-95%</a:t>
             </a:r>
           </a:p>
           <a:p>
             <a:pPr lvl="1"/>
             <a:r>
               <a:rPr lang="en-US" dirty="0"/>
-              <a:t>Which is excellent!</a:t>
+              <a:t>one class is much more frequent, the model can predict the majority class often, leading to low accuracy while still ranking positive cases correctly (high AUC)</a:t>
             </a:r>
           </a:p>
         </p:txBody>
@@ -8725,14 +8699,15 @@
           </a:p>
           <a:p>
             <a:r>
-              <a:rPr lang="en-US" sz="2400" b="0" i="0" dirty="0" err="1">
+              <a:rPr lang="en-US" sz="2400" b="0" i="0" dirty="0">
                 <a:solidFill>
                   <a:srgbClr val="1F2328"/>
                 </a:solidFill>
                 <a:effectLst/>
                 <a:latin typeface="-apple-system"/>
+                <a:hlinkClick r:id="rId4"/>
               </a:rPr>
-              <a:t>DeepWalk</a:t>
+              <a:t>DeepWalk: Online Learning of Social Representations</a:t>
             </a:r>
             <a:r>
               <a:rPr lang="en-US" sz="2400" b="0" i="0" dirty="0">
@@ -8742,7 +8717,7 @@
                 <a:effectLst/>
                 <a:latin typeface="-apple-system"/>
               </a:rPr>
-              <a:t>: Online Learning of Social Representations. Bryan </a:t>
+              <a:t>. Bryan </a:t>
             </a:r>
             <a:r>
               <a:rPr lang="en-US" sz="2400" b="0" i="0" dirty="0" err="1">
@@ -8813,8 +8788,19 @@
                 </a:solidFill>
                 <a:effectLst/>
                 <a:latin typeface="-apple-system"/>
+                <a:hlinkClick r:id="rId5"/>
               </a:rPr>
-              <a:t>node2vec: Scalable Feature Learning for Networks. Aditya Grover, Jure </a:t>
+              <a:t>node2vec: Scalable Feature Learning for Networks</a:t>
+            </a:r>
+            <a:r>
+              <a:rPr lang="en-US" sz="2400" b="0" i="0" dirty="0">
+                <a:solidFill>
+                  <a:srgbClr val="1F2328"/>
+                </a:solidFill>
+                <a:effectLst/>
+                <a:latin typeface="-apple-system"/>
+              </a:rPr>
+              <a:t>. Aditya Grover, Jure </a:t>
             </a:r>
             <a:r>
               <a:rPr lang="en-US" sz="2400" b="0" i="0" dirty="0" err="1">
@@ -8845,7 +8831,7 @@
                 </a:solidFill>
                 <a:effectLst/>
                 <a:latin typeface="-apple-system"/>
-                <a:hlinkClick r:id="rId4"/>
+                <a:hlinkClick r:id="rId6"/>
               </a:rPr>
               <a:t>Deep Walk and Node2Vec: Graph Embeddings</a:t>
             </a:r>
@@ -8863,7 +8849,7 @@
           <a:p>
             <a:r>
               <a:rPr lang="en-US" sz="2400" dirty="0">
-                <a:hlinkClick r:id="rId5"/>
+                <a:hlinkClick r:id="rId7"/>
               </a:rPr>
               <a:t>Skip-Gram Word2Vec Algorithm</a:t>
             </a:r>
@@ -8894,7 +8880,7 @@
           <p:nvPr/>
         </p:nvPicPr>
         <p:blipFill>
-          <a:blip r:embed="rId6"/>
+          <a:blip r:embed="rId8"/>
           <a:stretch>
             <a:fillRect/>
           </a:stretch>
@@ -9143,7 +9129,12 @@
             <p:ph idx="1"/>
           </p:nvPr>
         </p:nvSpPr>
-        <p:spPr/>
+        <p:spPr>
+          <a:xfrm>
+            <a:off x="838200" y="1418253"/>
+            <a:ext cx="10515600" cy="4758710"/>
+          </a:xfrm>
+        </p:spPr>
         <p:txBody>
           <a:bodyPr>
             <a:normAutofit/>
@@ -9187,8 +9178,8 @@
         </p:blipFill>
         <p:spPr>
           <a:xfrm>
-            <a:off x="8010525" y="2601692"/>
-            <a:ext cx="4075851" cy="4211378"/>
+            <a:off x="8873412" y="3493270"/>
+            <a:ext cx="3212964" cy="3319799"/>
           </a:xfrm>
           <a:prstGeom prst="rect">
             <a:avLst/>
@@ -9223,8 +9214,8 @@
         </p:blipFill>
         <p:spPr>
           <a:xfrm>
-            <a:off x="289500" y="3310997"/>
-            <a:ext cx="7620392" cy="3422826"/>
+            <a:off x="838200" y="3634336"/>
+            <a:ext cx="6755112" cy="3034171"/>
           </a:xfrm>
           <a:prstGeom prst="rect">
             <a:avLst/>
@@ -9313,7 +9304,7 @@
         </p:spPr>
         <p:txBody>
           <a:bodyPr>
-            <a:normAutofit lnSpcReduction="10000"/>
+            <a:normAutofit/>
           </a:bodyPr>
           <a:lstStyle/>
           <a:p>
@@ -9730,7 +9721,7 @@
         <p:spPr/>
         <p:txBody>
           <a:bodyPr>
-            <a:normAutofit fontScale="85000" lnSpcReduction="20000"/>
+            <a:normAutofit fontScale="92500" lnSpcReduction="20000"/>
           </a:bodyPr>
           <a:lstStyle/>
           <a:p>
@@ -10115,7 +10106,7 @@
         </p:spPr>
         <p:txBody>
           <a:bodyPr>
-            <a:normAutofit lnSpcReduction="10000"/>
+            <a:normAutofit/>
           </a:bodyPr>
           <a:lstStyle/>
           <a:p>

</xml_diff>